<commit_message>
Prezentacja z algorytmami (finanse)
</commit_message>
<xml_diff>
--- a/Prezentacja.pptx
+++ b/Prezentacja.pptx
@@ -28,6 +28,13 @@
     <p:sldId id="278" r:id="rId22"/>
     <p:sldId id="279" r:id="rId23"/>
     <p:sldId id="280" r:id="rId24"/>
+    <p:sldId id="281" r:id="rId25"/>
+    <p:sldId id="282" r:id="rId26"/>
+    <p:sldId id="283" r:id="rId27"/>
+    <p:sldId id="284" r:id="rId28"/>
+    <p:sldId id="285" r:id="rId29"/>
+    <p:sldId id="286" r:id="rId30"/>
+    <p:sldId id="287" r:id="rId31"/>
   </p:sldIdLst>
   <p:sldSz cx="12192000" cy="6858000"/>
   <p:notesSz cx="6858000" cy="9144000"/>
@@ -5837,7 +5844,7 @@
           <a:p>
             <a:fld id="{844F4C65-81A9-4BCE-8E42-0A35E075B4F9}" type="datetimeFigureOut">
               <a:rPr lang="pl-PL" smtClean="0"/>
-              <a:t>27.04.2021</a:t>
+              <a:t>27-04-2021</a:t>
             </a:fld>
             <a:endParaRPr lang="pl-PL"/>
           </a:p>
@@ -6251,7 +6258,7 @@
           <a:p>
             <a:fld id="{844F4C65-81A9-4BCE-8E42-0A35E075B4F9}" type="datetimeFigureOut">
               <a:rPr lang="pl-PL" smtClean="0"/>
-              <a:t>27.04.2021</a:t>
+              <a:t>27-04-2021</a:t>
             </a:fld>
             <a:endParaRPr lang="pl-PL"/>
           </a:p>
@@ -6587,7 +6594,7 @@
           <a:p>
             <a:fld id="{844F4C65-81A9-4BCE-8E42-0A35E075B4F9}" type="datetimeFigureOut">
               <a:rPr lang="pl-PL" smtClean="0"/>
-              <a:t>27.04.2021</a:t>
+              <a:t>27-04-2021</a:t>
             </a:fld>
             <a:endParaRPr lang="pl-PL"/>
           </a:p>
@@ -6992,7 +6999,7 @@
           <a:p>
             <a:fld id="{844F4C65-81A9-4BCE-8E42-0A35E075B4F9}" type="datetimeFigureOut">
               <a:rPr lang="pl-PL" smtClean="0"/>
-              <a:t>27.04.2021</a:t>
+              <a:t>27-04-2021</a:t>
             </a:fld>
             <a:endParaRPr lang="pl-PL"/>
           </a:p>
@@ -7560,7 +7567,7 @@
           <a:p>
             <a:fld id="{844F4C65-81A9-4BCE-8E42-0A35E075B4F9}" type="datetimeFigureOut">
               <a:rPr lang="pl-PL" smtClean="0"/>
-              <a:t>27.04.2021</a:t>
+              <a:t>27-04-2021</a:t>
             </a:fld>
             <a:endParaRPr lang="pl-PL"/>
           </a:p>
@@ -8241,7 +8248,7 @@
           <a:p>
             <a:fld id="{844F4C65-81A9-4BCE-8E42-0A35E075B4F9}" type="datetimeFigureOut">
               <a:rPr lang="pl-PL" smtClean="0"/>
-              <a:t>27.04.2021</a:t>
+              <a:t>27-04-2021</a:t>
             </a:fld>
             <a:endParaRPr lang="pl-PL"/>
           </a:p>
@@ -9154,7 +9161,7 @@
           <a:p>
             <a:fld id="{844F4C65-81A9-4BCE-8E42-0A35E075B4F9}" type="datetimeFigureOut">
               <a:rPr lang="pl-PL" smtClean="0"/>
-              <a:t>27.04.2021</a:t>
+              <a:t>27-04-2021</a:t>
             </a:fld>
             <a:endParaRPr lang="pl-PL"/>
           </a:p>
@@ -9467,7 +9474,7 @@
           <a:p>
             <a:fld id="{844F4C65-81A9-4BCE-8E42-0A35E075B4F9}" type="datetimeFigureOut">
               <a:rPr lang="pl-PL" smtClean="0"/>
-              <a:t>27.04.2021</a:t>
+              <a:t>27-04-2021</a:t>
             </a:fld>
             <a:endParaRPr lang="pl-PL"/>
           </a:p>
@@ -9731,7 +9738,7 @@
           <a:p>
             <a:fld id="{844F4C65-81A9-4BCE-8E42-0A35E075B4F9}" type="datetimeFigureOut">
               <a:rPr lang="pl-PL" smtClean="0"/>
-              <a:t>27.04.2021</a:t>
+              <a:t>27-04-2021</a:t>
             </a:fld>
             <a:endParaRPr lang="pl-PL"/>
           </a:p>
@@ -10054,7 +10061,7 @@
           <a:p>
             <a:fld id="{844F4C65-81A9-4BCE-8E42-0A35E075B4F9}" type="datetimeFigureOut">
               <a:rPr lang="pl-PL" smtClean="0"/>
-              <a:t>27.04.2021</a:t>
+              <a:t>27-04-2021</a:t>
             </a:fld>
             <a:endParaRPr lang="pl-PL"/>
           </a:p>
@@ -10443,7 +10450,7 @@
           <a:p>
             <a:fld id="{844F4C65-81A9-4BCE-8E42-0A35E075B4F9}" type="datetimeFigureOut">
               <a:rPr lang="pl-PL" smtClean="0"/>
-              <a:t>27.04.2021</a:t>
+              <a:t>27-04-2021</a:t>
             </a:fld>
             <a:endParaRPr lang="pl-PL"/>
           </a:p>
@@ -10819,7 +10826,7 @@
           <a:p>
             <a:fld id="{844F4C65-81A9-4BCE-8E42-0A35E075B4F9}" type="datetimeFigureOut">
               <a:rPr lang="pl-PL" smtClean="0"/>
-              <a:t>27.04.2021</a:t>
+              <a:t>27-04-2021</a:t>
             </a:fld>
             <a:endParaRPr lang="pl-PL"/>
           </a:p>
@@ -11325,7 +11332,7 @@
           <a:p>
             <a:fld id="{844F4C65-81A9-4BCE-8E42-0A35E075B4F9}" type="datetimeFigureOut">
               <a:rPr lang="pl-PL" smtClean="0"/>
-              <a:t>27.04.2021</a:t>
+              <a:t>27-04-2021</a:t>
             </a:fld>
             <a:endParaRPr lang="pl-PL"/>
           </a:p>
@@ -11582,7 +11589,7 @@
           <a:p>
             <a:fld id="{844F4C65-81A9-4BCE-8E42-0A35E075B4F9}" type="datetimeFigureOut">
               <a:rPr lang="pl-PL" smtClean="0"/>
-              <a:t>27.04.2021</a:t>
+              <a:t>27-04-2021</a:t>
             </a:fld>
             <a:endParaRPr lang="pl-PL"/>
           </a:p>
@@ -11745,7 +11752,7 @@
           <a:p>
             <a:fld id="{844F4C65-81A9-4BCE-8E42-0A35E075B4F9}" type="datetimeFigureOut">
               <a:rPr lang="pl-PL" smtClean="0"/>
-              <a:t>27.04.2021</a:t>
+              <a:t>27-04-2021</a:t>
             </a:fld>
             <a:endParaRPr lang="pl-PL"/>
           </a:p>
@@ -12135,7 +12142,7 @@
           <a:p>
             <a:fld id="{844F4C65-81A9-4BCE-8E42-0A35E075B4F9}" type="datetimeFigureOut">
               <a:rPr lang="pl-PL" smtClean="0"/>
-              <a:t>27.04.2021</a:t>
+              <a:t>27-04-2021</a:t>
             </a:fld>
             <a:endParaRPr lang="pl-PL"/>
           </a:p>
@@ -12544,7 +12551,7 @@
           <a:p>
             <a:fld id="{844F4C65-81A9-4BCE-8E42-0A35E075B4F9}" type="datetimeFigureOut">
               <a:rPr lang="pl-PL" smtClean="0"/>
-              <a:t>27.04.2021</a:t>
+              <a:t>27-04-2021</a:t>
             </a:fld>
             <a:endParaRPr lang="pl-PL"/>
           </a:p>
@@ -12788,7 +12795,7 @@
           <a:p>
             <a:fld id="{844F4C65-81A9-4BCE-8E42-0A35E075B4F9}" type="datetimeFigureOut">
               <a:rPr lang="pl-PL" smtClean="0"/>
-              <a:t>27.04.2021</a:t>
+              <a:t>27-04-2021</a:t>
             </a:fld>
             <a:endParaRPr lang="pl-PL"/>
           </a:p>
@@ -17797,6 +17804,534 @@
 </p:sld>
 </file>
 
+<file path=ppt/slides/slide24.xml><?xml version="1.0" encoding="utf-8"?>
+<p:sld xmlns:a="http://schemas.openxmlformats.org/drawingml/2006/main" xmlns:r="http://schemas.openxmlformats.org/officeDocument/2006/relationships" xmlns:p="http://schemas.openxmlformats.org/presentationml/2006/main">
+  <p:cSld>
+    <p:spTree>
+      <p:nvGrpSpPr>
+        <p:cNvPr id="1" name=""/>
+        <p:cNvGrpSpPr/>
+        <p:nvPr/>
+      </p:nvGrpSpPr>
+      <p:grpSpPr>
+        <a:xfrm>
+          <a:off x="0" y="0"/>
+          <a:ext cx="0" cy="0"/>
+          <a:chOff x="0" y="0"/>
+          <a:chExt cx="0" cy="0"/>
+        </a:xfrm>
+      </p:grpSpPr>
+      <p:sp>
+        <p:nvSpPr>
+          <p:cNvPr id="2" name="Tytuł 1">
+            <a:extLst>
+              <a:ext uri="{FF2B5EF4-FFF2-40B4-BE49-F238E27FC236}">
+                <a16:creationId xmlns:a16="http://schemas.microsoft.com/office/drawing/2014/main" id="{19DA3A90-709B-45A7-A9D0-9ABDD69621A6}"/>
+              </a:ext>
+            </a:extLst>
+          </p:cNvPr>
+          <p:cNvSpPr>
+            <a:spLocks noGrp="1"/>
+          </p:cNvSpPr>
+          <p:nvPr>
+            <p:ph type="title"/>
+          </p:nvPr>
+        </p:nvSpPr>
+        <p:spPr/>
+        <p:txBody>
+          <a:bodyPr/>
+          <a:lstStyle/>
+          <a:p>
+            <a:r>
+              <a:rPr lang="pl-PL" dirty="0"/>
+              <a:t>Oferta dla klienta</a:t>
+            </a:r>
+          </a:p>
+        </p:txBody>
+      </p:sp>
+      <p:pic>
+        <p:nvPicPr>
+          <p:cNvPr id="4" name="Obraz 3">
+            <a:extLst>
+              <a:ext uri="{FF2B5EF4-FFF2-40B4-BE49-F238E27FC236}">
+                <a16:creationId xmlns:a16="http://schemas.microsoft.com/office/drawing/2014/main" id="{8509ED13-FAE5-4112-8309-0970D0FB449B}"/>
+              </a:ext>
+            </a:extLst>
+          </p:cNvPr>
+          <p:cNvPicPr>
+            <a:picLocks noChangeAspect="1"/>
+          </p:cNvPicPr>
+          <p:nvPr/>
+        </p:nvPicPr>
+        <p:blipFill>
+          <a:blip r:embed="rId2"/>
+          <a:stretch>
+            <a:fillRect/>
+          </a:stretch>
+        </p:blipFill>
+        <p:spPr>
+          <a:xfrm>
+            <a:off x="4831750" y="0"/>
+            <a:ext cx="7360250" cy="6858000"/>
+          </a:xfrm>
+          <a:prstGeom prst="rect">
+            <a:avLst/>
+          </a:prstGeom>
+        </p:spPr>
+      </p:pic>
+    </p:spTree>
+    <p:extLst>
+      <p:ext uri="{BB962C8B-B14F-4D97-AF65-F5344CB8AC3E}">
+        <p14:creationId xmlns:p14="http://schemas.microsoft.com/office/powerpoint/2010/main" val="832810156"/>
+      </p:ext>
+    </p:extLst>
+  </p:cSld>
+  <p:clrMapOvr>
+    <a:masterClrMapping/>
+  </p:clrMapOvr>
+</p:sld>
+</file>
+
+<file path=ppt/slides/slide25.xml><?xml version="1.0" encoding="utf-8"?>
+<p:sld xmlns:a="http://schemas.openxmlformats.org/drawingml/2006/main" xmlns:r="http://schemas.openxmlformats.org/officeDocument/2006/relationships" xmlns:p="http://schemas.openxmlformats.org/presentationml/2006/main">
+  <p:cSld>
+    <p:spTree>
+      <p:nvGrpSpPr>
+        <p:cNvPr id="1" name=""/>
+        <p:cNvGrpSpPr/>
+        <p:nvPr/>
+      </p:nvGrpSpPr>
+      <p:grpSpPr>
+        <a:xfrm>
+          <a:off x="0" y="0"/>
+          <a:ext cx="0" cy="0"/>
+          <a:chOff x="0" y="0"/>
+          <a:chExt cx="0" cy="0"/>
+        </a:xfrm>
+      </p:grpSpPr>
+      <p:sp>
+        <p:nvSpPr>
+          <p:cNvPr id="2" name="Tytuł 1">
+            <a:extLst>
+              <a:ext uri="{FF2B5EF4-FFF2-40B4-BE49-F238E27FC236}">
+                <a16:creationId xmlns:a16="http://schemas.microsoft.com/office/drawing/2014/main" id="{9A9CFD2E-1CB9-4BE0-A19F-39F50F06787F}"/>
+              </a:ext>
+            </a:extLst>
+          </p:cNvPr>
+          <p:cNvSpPr>
+            <a:spLocks noGrp="1"/>
+          </p:cNvSpPr>
+          <p:nvPr>
+            <p:ph type="title"/>
+          </p:nvPr>
+        </p:nvSpPr>
+        <p:spPr/>
+        <p:txBody>
+          <a:bodyPr/>
+          <a:lstStyle/>
+          <a:p>
+            <a:r>
+              <a:rPr lang="pl-PL" dirty="0"/>
+              <a:t>Wypłata</a:t>
+            </a:r>
+          </a:p>
+        </p:txBody>
+      </p:sp>
+      <p:pic>
+        <p:nvPicPr>
+          <p:cNvPr id="4" name="Obraz 3">
+            <a:extLst>
+              <a:ext uri="{FF2B5EF4-FFF2-40B4-BE49-F238E27FC236}">
+                <a16:creationId xmlns:a16="http://schemas.microsoft.com/office/drawing/2014/main" id="{14D4A556-F700-4B18-B05F-CC473388AA33}"/>
+              </a:ext>
+            </a:extLst>
+          </p:cNvPr>
+          <p:cNvPicPr>
+            <a:picLocks noChangeAspect="1"/>
+          </p:cNvPicPr>
+          <p:nvPr/>
+        </p:nvPicPr>
+        <p:blipFill>
+          <a:blip r:embed="rId2"/>
+          <a:stretch>
+            <a:fillRect/>
+          </a:stretch>
+        </p:blipFill>
+        <p:spPr>
+          <a:xfrm>
+            <a:off x="4756079" y="0"/>
+            <a:ext cx="7435921" cy="6858000"/>
+          </a:xfrm>
+          <a:prstGeom prst="rect">
+            <a:avLst/>
+          </a:prstGeom>
+        </p:spPr>
+      </p:pic>
+    </p:spTree>
+    <p:extLst>
+      <p:ext uri="{BB962C8B-B14F-4D97-AF65-F5344CB8AC3E}">
+        <p14:creationId xmlns:p14="http://schemas.microsoft.com/office/powerpoint/2010/main" val="1920037621"/>
+      </p:ext>
+    </p:extLst>
+  </p:cSld>
+  <p:clrMapOvr>
+    <a:masterClrMapping/>
+  </p:clrMapOvr>
+</p:sld>
+</file>
+
+<file path=ppt/slides/slide26.xml><?xml version="1.0" encoding="utf-8"?>
+<p:sld xmlns:a="http://schemas.openxmlformats.org/drawingml/2006/main" xmlns:r="http://schemas.openxmlformats.org/officeDocument/2006/relationships" xmlns:p="http://schemas.openxmlformats.org/presentationml/2006/main">
+  <p:cSld>
+    <p:spTree>
+      <p:nvGrpSpPr>
+        <p:cNvPr id="1" name=""/>
+        <p:cNvGrpSpPr/>
+        <p:nvPr/>
+      </p:nvGrpSpPr>
+      <p:grpSpPr>
+        <a:xfrm>
+          <a:off x="0" y="0"/>
+          <a:ext cx="0" cy="0"/>
+          <a:chOff x="0" y="0"/>
+          <a:chExt cx="0" cy="0"/>
+        </a:xfrm>
+      </p:grpSpPr>
+      <p:sp>
+        <p:nvSpPr>
+          <p:cNvPr id="2" name="Tytuł 1">
+            <a:extLst>
+              <a:ext uri="{FF2B5EF4-FFF2-40B4-BE49-F238E27FC236}">
+                <a16:creationId xmlns:a16="http://schemas.microsoft.com/office/drawing/2014/main" id="{E1F8C03E-5A14-439F-B27D-CDD677731858}"/>
+              </a:ext>
+            </a:extLst>
+          </p:cNvPr>
+          <p:cNvSpPr>
+            <a:spLocks noGrp="1"/>
+          </p:cNvSpPr>
+          <p:nvPr>
+            <p:ph type="title"/>
+          </p:nvPr>
+        </p:nvSpPr>
+        <p:spPr/>
+        <p:txBody>
+          <a:bodyPr/>
+          <a:lstStyle/>
+          <a:p>
+            <a:r>
+              <a:rPr lang="pl-PL" dirty="0"/>
+              <a:t>Wydanie faktury</a:t>
+            </a:r>
+          </a:p>
+        </p:txBody>
+      </p:sp>
+      <p:pic>
+        <p:nvPicPr>
+          <p:cNvPr id="7" name="Obraz 6">
+            <a:extLst>
+              <a:ext uri="{FF2B5EF4-FFF2-40B4-BE49-F238E27FC236}">
+                <a16:creationId xmlns:a16="http://schemas.microsoft.com/office/drawing/2014/main" id="{939B5A5B-8AA5-4A86-81E7-E31717C7B186}"/>
+              </a:ext>
+            </a:extLst>
+          </p:cNvPr>
+          <p:cNvPicPr>
+            <a:picLocks noChangeAspect="1"/>
+          </p:cNvPicPr>
+          <p:nvPr/>
+        </p:nvPicPr>
+        <p:blipFill>
+          <a:blip r:embed="rId2"/>
+          <a:stretch>
+            <a:fillRect/>
+          </a:stretch>
+        </p:blipFill>
+        <p:spPr>
+          <a:xfrm>
+            <a:off x="4877831" y="0"/>
+            <a:ext cx="7314169" cy="6858000"/>
+          </a:xfrm>
+          <a:prstGeom prst="rect">
+            <a:avLst/>
+          </a:prstGeom>
+        </p:spPr>
+      </p:pic>
+    </p:spTree>
+    <p:extLst>
+      <p:ext uri="{BB962C8B-B14F-4D97-AF65-F5344CB8AC3E}">
+        <p14:creationId xmlns:p14="http://schemas.microsoft.com/office/powerpoint/2010/main" val="3936350770"/>
+      </p:ext>
+    </p:extLst>
+  </p:cSld>
+  <p:clrMapOvr>
+    <a:masterClrMapping/>
+  </p:clrMapOvr>
+</p:sld>
+</file>
+
+<file path=ppt/slides/slide27.xml><?xml version="1.0" encoding="utf-8"?>
+<p:sld xmlns:a="http://schemas.openxmlformats.org/drawingml/2006/main" xmlns:r="http://schemas.openxmlformats.org/officeDocument/2006/relationships" xmlns:p="http://schemas.openxmlformats.org/presentationml/2006/main">
+  <p:cSld>
+    <p:spTree>
+      <p:nvGrpSpPr>
+        <p:cNvPr id="1" name=""/>
+        <p:cNvGrpSpPr/>
+        <p:nvPr/>
+      </p:nvGrpSpPr>
+      <p:grpSpPr>
+        <a:xfrm>
+          <a:off x="0" y="0"/>
+          <a:ext cx="0" cy="0"/>
+          <a:chOff x="0" y="0"/>
+          <a:chExt cx="0" cy="0"/>
+        </a:xfrm>
+      </p:grpSpPr>
+      <p:sp>
+        <p:nvSpPr>
+          <p:cNvPr id="2" name="Tytuł 1">
+            <a:extLst>
+              <a:ext uri="{FF2B5EF4-FFF2-40B4-BE49-F238E27FC236}">
+                <a16:creationId xmlns:a16="http://schemas.microsoft.com/office/drawing/2014/main" id="{FADA5054-ACC2-481A-94EC-C1483A2C0ACB}"/>
+              </a:ext>
+            </a:extLst>
+          </p:cNvPr>
+          <p:cNvSpPr>
+            <a:spLocks noGrp="1"/>
+          </p:cNvSpPr>
+          <p:nvPr>
+            <p:ph type="title"/>
+          </p:nvPr>
+        </p:nvSpPr>
+        <p:spPr/>
+        <p:txBody>
+          <a:bodyPr/>
+          <a:lstStyle/>
+          <a:p>
+            <a:r>
+              <a:rPr lang="pl-PL" dirty="0"/>
+              <a:t>Wpływy</a:t>
+            </a:r>
+          </a:p>
+        </p:txBody>
+      </p:sp>
+      <p:pic>
+        <p:nvPicPr>
+          <p:cNvPr id="4" name="Obraz 3">
+            <a:extLst>
+              <a:ext uri="{FF2B5EF4-FFF2-40B4-BE49-F238E27FC236}">
+                <a16:creationId xmlns:a16="http://schemas.microsoft.com/office/drawing/2014/main" id="{254452A8-7EC6-4D0B-87AF-D3B884F1213A}"/>
+              </a:ext>
+            </a:extLst>
+          </p:cNvPr>
+          <p:cNvPicPr>
+            <a:picLocks noChangeAspect="1"/>
+          </p:cNvPicPr>
+          <p:nvPr/>
+        </p:nvPicPr>
+        <p:blipFill>
+          <a:blip r:embed="rId2"/>
+          <a:stretch>
+            <a:fillRect/>
+          </a:stretch>
+        </p:blipFill>
+        <p:spPr>
+          <a:xfrm>
+            <a:off x="5896790" y="0"/>
+            <a:ext cx="6295210" cy="6858000"/>
+          </a:xfrm>
+          <a:prstGeom prst="rect">
+            <a:avLst/>
+          </a:prstGeom>
+        </p:spPr>
+      </p:pic>
+    </p:spTree>
+    <p:extLst>
+      <p:ext uri="{BB962C8B-B14F-4D97-AF65-F5344CB8AC3E}">
+        <p14:creationId xmlns:p14="http://schemas.microsoft.com/office/powerpoint/2010/main" val="2035800844"/>
+      </p:ext>
+    </p:extLst>
+  </p:cSld>
+  <p:clrMapOvr>
+    <a:masterClrMapping/>
+  </p:clrMapOvr>
+</p:sld>
+</file>
+
+<file path=ppt/slides/slide28.xml><?xml version="1.0" encoding="utf-8"?>
+<p:sld xmlns:a="http://schemas.openxmlformats.org/drawingml/2006/main" xmlns:r="http://schemas.openxmlformats.org/officeDocument/2006/relationships" xmlns:p="http://schemas.openxmlformats.org/presentationml/2006/main">
+  <p:cSld>
+    <p:spTree>
+      <p:nvGrpSpPr>
+        <p:cNvPr id="1" name=""/>
+        <p:cNvGrpSpPr/>
+        <p:nvPr/>
+      </p:nvGrpSpPr>
+      <p:grpSpPr>
+        <a:xfrm>
+          <a:off x="0" y="0"/>
+          <a:ext cx="0" cy="0"/>
+          <a:chOff x="0" y="0"/>
+          <a:chExt cx="0" cy="0"/>
+        </a:xfrm>
+      </p:grpSpPr>
+      <p:sp>
+        <p:nvSpPr>
+          <p:cNvPr id="2" name="Tytuł 1">
+            <a:extLst>
+              <a:ext uri="{FF2B5EF4-FFF2-40B4-BE49-F238E27FC236}">
+                <a16:creationId xmlns:a16="http://schemas.microsoft.com/office/drawing/2014/main" id="{7B20D057-D7F8-484A-99CE-44C5074C854D}"/>
+              </a:ext>
+            </a:extLst>
+          </p:cNvPr>
+          <p:cNvSpPr>
+            <a:spLocks noGrp="1"/>
+          </p:cNvSpPr>
+          <p:nvPr>
+            <p:ph type="title"/>
+          </p:nvPr>
+        </p:nvSpPr>
+        <p:spPr/>
+        <p:txBody>
+          <a:bodyPr/>
+          <a:lstStyle/>
+          <a:p>
+            <a:r>
+              <a:rPr lang="pl-PL" dirty="0"/>
+              <a:t>Opłaty stałe</a:t>
+            </a:r>
+          </a:p>
+        </p:txBody>
+      </p:sp>
+      <p:pic>
+        <p:nvPicPr>
+          <p:cNvPr id="6" name="Obraz 5">
+            <a:extLst>
+              <a:ext uri="{FF2B5EF4-FFF2-40B4-BE49-F238E27FC236}">
+                <a16:creationId xmlns:a16="http://schemas.microsoft.com/office/drawing/2014/main" id="{72AFA74C-DC3D-4FE9-BCDC-90FB0B3C2076}"/>
+              </a:ext>
+            </a:extLst>
+          </p:cNvPr>
+          <p:cNvPicPr>
+            <a:picLocks noChangeAspect="1"/>
+          </p:cNvPicPr>
+          <p:nvPr/>
+        </p:nvPicPr>
+        <p:blipFill>
+          <a:blip r:embed="rId2"/>
+          <a:stretch>
+            <a:fillRect/>
+          </a:stretch>
+        </p:blipFill>
+        <p:spPr>
+          <a:xfrm>
+            <a:off x="6338468" y="1970202"/>
+            <a:ext cx="5853532" cy="4887798"/>
+          </a:xfrm>
+          <a:prstGeom prst="rect">
+            <a:avLst/>
+          </a:prstGeom>
+        </p:spPr>
+      </p:pic>
+    </p:spTree>
+    <p:extLst>
+      <p:ext uri="{BB962C8B-B14F-4D97-AF65-F5344CB8AC3E}">
+        <p14:creationId xmlns:p14="http://schemas.microsoft.com/office/powerpoint/2010/main" val="2070685674"/>
+      </p:ext>
+    </p:extLst>
+  </p:cSld>
+  <p:clrMapOvr>
+    <a:masterClrMapping/>
+  </p:clrMapOvr>
+</p:sld>
+</file>
+
+<file path=ppt/slides/slide29.xml><?xml version="1.0" encoding="utf-8"?>
+<p:sld xmlns:a="http://schemas.openxmlformats.org/drawingml/2006/main" xmlns:r="http://schemas.openxmlformats.org/officeDocument/2006/relationships" xmlns:p="http://schemas.openxmlformats.org/presentationml/2006/main">
+  <p:cSld>
+    <p:spTree>
+      <p:nvGrpSpPr>
+        <p:cNvPr id="1" name=""/>
+        <p:cNvGrpSpPr/>
+        <p:nvPr/>
+      </p:nvGrpSpPr>
+      <p:grpSpPr>
+        <a:xfrm>
+          <a:off x="0" y="0"/>
+          <a:ext cx="0" cy="0"/>
+          <a:chOff x="0" y="0"/>
+          <a:chExt cx="0" cy="0"/>
+        </a:xfrm>
+      </p:grpSpPr>
+      <p:sp>
+        <p:nvSpPr>
+          <p:cNvPr id="2" name="Tytuł 1">
+            <a:extLst>
+              <a:ext uri="{FF2B5EF4-FFF2-40B4-BE49-F238E27FC236}">
+                <a16:creationId xmlns:a16="http://schemas.microsoft.com/office/drawing/2014/main" id="{C91C4CD4-9C96-4AF4-ACE0-9CFD711A54A3}"/>
+              </a:ext>
+            </a:extLst>
+          </p:cNvPr>
+          <p:cNvSpPr>
+            <a:spLocks noGrp="1"/>
+          </p:cNvSpPr>
+          <p:nvPr>
+            <p:ph type="title"/>
+          </p:nvPr>
+        </p:nvSpPr>
+        <p:spPr/>
+        <p:txBody>
+          <a:bodyPr/>
+          <a:lstStyle/>
+          <a:p>
+            <a:r>
+              <a:rPr lang="pl-PL" dirty="0"/>
+              <a:t>Koszty zewnętrzne</a:t>
+            </a:r>
+          </a:p>
+        </p:txBody>
+      </p:sp>
+      <p:pic>
+        <p:nvPicPr>
+          <p:cNvPr id="9" name="Obraz 8">
+            <a:extLst>
+              <a:ext uri="{FF2B5EF4-FFF2-40B4-BE49-F238E27FC236}">
+                <a16:creationId xmlns:a16="http://schemas.microsoft.com/office/drawing/2014/main" id="{4F5E7033-4E35-46C3-9236-7682A1020BB3}"/>
+              </a:ext>
+            </a:extLst>
+          </p:cNvPr>
+          <p:cNvPicPr>
+            <a:picLocks noChangeAspect="1"/>
+          </p:cNvPicPr>
+          <p:nvPr/>
+        </p:nvPicPr>
+        <p:blipFill>
+          <a:blip r:embed="rId2"/>
+          <a:stretch>
+            <a:fillRect/>
+          </a:stretch>
+        </p:blipFill>
+        <p:spPr>
+          <a:xfrm>
+            <a:off x="1463591" y="1979629"/>
+            <a:ext cx="10728409" cy="4878371"/>
+          </a:xfrm>
+          <a:prstGeom prst="rect">
+            <a:avLst/>
+          </a:prstGeom>
+        </p:spPr>
+      </p:pic>
+    </p:spTree>
+    <p:extLst>
+      <p:ext uri="{BB962C8B-B14F-4D97-AF65-F5344CB8AC3E}">
+        <p14:creationId xmlns:p14="http://schemas.microsoft.com/office/powerpoint/2010/main" val="166801903"/>
+      </p:ext>
+    </p:extLst>
+  </p:cSld>
+  <p:clrMapOvr>
+    <a:masterClrMapping/>
+  </p:clrMapOvr>
+</p:sld>
+</file>
+
 <file path=ppt/slides/slide3.xml><?xml version="1.0" encoding="utf-8"?>
 <p:sld xmlns:a="http://schemas.openxmlformats.org/drawingml/2006/main" xmlns:r="http://schemas.openxmlformats.org/officeDocument/2006/relationships" xmlns:p="http://schemas.openxmlformats.org/presentationml/2006/main" show="0">
   <p:cSld>
@@ -17912,6 +18447,94 @@
     <p:extLst>
       <p:ext uri="{BB962C8B-B14F-4D97-AF65-F5344CB8AC3E}">
         <p14:creationId xmlns:p14="http://schemas.microsoft.com/office/powerpoint/2010/main" val="1577202253"/>
+      </p:ext>
+    </p:extLst>
+  </p:cSld>
+  <p:clrMapOvr>
+    <a:masterClrMapping/>
+  </p:clrMapOvr>
+</p:sld>
+</file>
+
+<file path=ppt/slides/slide30.xml><?xml version="1.0" encoding="utf-8"?>
+<p:sld xmlns:a="http://schemas.openxmlformats.org/drawingml/2006/main" xmlns:r="http://schemas.openxmlformats.org/officeDocument/2006/relationships" xmlns:p="http://schemas.openxmlformats.org/presentationml/2006/main">
+  <p:cSld>
+    <p:spTree>
+      <p:nvGrpSpPr>
+        <p:cNvPr id="1" name=""/>
+        <p:cNvGrpSpPr/>
+        <p:nvPr/>
+      </p:nvGrpSpPr>
+      <p:grpSpPr>
+        <a:xfrm>
+          <a:off x="0" y="0"/>
+          <a:ext cx="0" cy="0"/>
+          <a:chOff x="0" y="0"/>
+          <a:chExt cx="0" cy="0"/>
+        </a:xfrm>
+      </p:grpSpPr>
+      <p:sp>
+        <p:nvSpPr>
+          <p:cNvPr id="2" name="Tytuł 1">
+            <a:extLst>
+              <a:ext uri="{FF2B5EF4-FFF2-40B4-BE49-F238E27FC236}">
+                <a16:creationId xmlns:a16="http://schemas.microsoft.com/office/drawing/2014/main" id="{EC002D38-331E-4C43-851E-7B2A0C90C1DA}"/>
+              </a:ext>
+            </a:extLst>
+          </p:cNvPr>
+          <p:cNvSpPr>
+            <a:spLocks noGrp="1"/>
+          </p:cNvSpPr>
+          <p:nvPr>
+            <p:ph type="title"/>
+          </p:nvPr>
+        </p:nvSpPr>
+        <p:spPr/>
+        <p:txBody>
+          <a:bodyPr/>
+          <a:lstStyle/>
+          <a:p>
+            <a:r>
+              <a:rPr lang="pl-PL" dirty="0"/>
+              <a:t>Bilans miesięczny</a:t>
+            </a:r>
+          </a:p>
+        </p:txBody>
+      </p:sp>
+      <p:pic>
+        <p:nvPicPr>
+          <p:cNvPr id="7" name="Obraz 6">
+            <a:extLst>
+              <a:ext uri="{FF2B5EF4-FFF2-40B4-BE49-F238E27FC236}">
+                <a16:creationId xmlns:a16="http://schemas.microsoft.com/office/drawing/2014/main" id="{B45ADEC8-6B9D-427C-8870-B7831A54D77F}"/>
+              </a:ext>
+            </a:extLst>
+          </p:cNvPr>
+          <p:cNvPicPr>
+            <a:picLocks noChangeAspect="1"/>
+          </p:cNvPicPr>
+          <p:nvPr/>
+        </p:nvPicPr>
+        <p:blipFill>
+          <a:blip r:embed="rId2"/>
+          <a:stretch>
+            <a:fillRect/>
+          </a:stretch>
+        </p:blipFill>
+        <p:spPr>
+          <a:xfrm>
+            <a:off x="7692272" y="622169"/>
+            <a:ext cx="4499728" cy="6235831"/>
+          </a:xfrm>
+          <a:prstGeom prst="rect">
+            <a:avLst/>
+          </a:prstGeom>
+        </p:spPr>
+      </p:pic>
+    </p:spTree>
+    <p:extLst>
+      <p:ext uri="{BB962C8B-B14F-4D97-AF65-F5344CB8AC3E}">
+        <p14:creationId xmlns:p14="http://schemas.microsoft.com/office/powerpoint/2010/main" val="318629951"/>
       </p:ext>
     </p:extLst>
   </p:cSld>

</xml_diff>